<commit_message>
MECM PT/Release V1.0/ATP MECM Integration.pptx
</commit_message>
<xml_diff>
--- a/MECM PT/Release V1.0/ATP MECM Integration.pptx
+++ b/MECM PT/Release V1.0/ATP MECM Integration.pptx
@@ -72,35 +72,7 @@
                 </a:uFill>
                 <a:latin typeface="Arial"/>
               </a:rPr>
-              <a:t>Click to edit </a:t>
-            </a:r>
-            <a:r>
-              <a:rPr b="0" lang="en-IN" sz="2000" spc="-1" strike="noStrike">
-                <a:solidFill>
-                  <a:srgbClr val="000000"/>
-                </a:solidFill>
-                <a:uFill>
-                  <a:solidFill>
-                    <a:srgbClr val="ffffff"/>
-                  </a:solidFill>
-                </a:uFill>
-                <a:latin typeface="Arial"/>
-              </a:rPr>
-              <a:t>the notes </a:t>
-            </a:r>
-            <a:r>
-              <a:rPr b="0" lang="en-IN" sz="2000" spc="-1" strike="noStrike">
-                <a:solidFill>
-                  <a:srgbClr val="000000"/>
-                </a:solidFill>
-                <a:uFill>
-                  <a:solidFill>
-                    <a:srgbClr val="ffffff"/>
-                  </a:solidFill>
-                </a:uFill>
-                <a:latin typeface="Arial"/>
-              </a:rPr>
-              <a:t>format</a:t>
+              <a:t>Click to edit the notes format</a:t>
             </a:r>
             <a:endParaRPr b="0" lang="en-IN" sz="2000" spc="-1" strike="noStrike">
               <a:solidFill>
@@ -290,7 +262,7 @@
           <a:bodyPr lIns="0" rIns="0" tIns="0" bIns="0" anchor="b"/>
           <a:p>
             <a:pPr algn="r"/>
-            <a:fld id="{CE8F3AAC-B1F7-4F23-AEE7-9D4E9E7F9E84}" type="slidenum">
+            <a:fld id="{367F26C6-7DFB-43C6-8C8F-69ED72EB03C2}" type="slidenum">
               <a:rPr b="0" lang="en-IN" sz="1400" spc="-1" strike="noStrike">
                 <a:solidFill>
                   <a:srgbClr val="000000"/>
@@ -343,7 +315,7 @@
       </p:grpSpPr>
       <p:sp>
         <p:nvSpPr>
-          <p:cNvPr id="106" name="PlaceHolder 1"/>
+          <p:cNvPr id="108" name="PlaceHolder 1"/>
           <p:cNvSpPr>
             <a:spLocks noGrp="1"/>
           </p:cNvSpPr>
@@ -354,7 +326,7 @@
         <p:spPr>
           <a:xfrm>
             <a:off x="685800" y="4343400"/>
-            <a:ext cx="5484600" cy="4113000"/>
+            <a:ext cx="5484240" cy="4112640"/>
           </a:xfrm>
           <a:prstGeom prst="rect">
             <a:avLst/>
@@ -363,7 +335,7 @@
         <p:txBody>
           <a:bodyPr lIns="0" rIns="0" tIns="91440" bIns="91440"/>
           <a:p>
-            <a:pPr marL="216000" indent="-214920">
+            <a:pPr marL="216000" indent="-214560">
               <a:lnSpc>
                 <a:spcPct val="100000"/>
               </a:lnSpc>
@@ -421,7 +393,7 @@
       </p:grpSpPr>
       <p:sp>
         <p:nvSpPr>
-          <p:cNvPr id="107" name="PlaceHolder 1"/>
+          <p:cNvPr id="109" name="PlaceHolder 1"/>
           <p:cNvSpPr>
             <a:spLocks noGrp="1"/>
           </p:cNvSpPr>
@@ -432,7 +404,7 @@
         <p:spPr>
           <a:xfrm>
             <a:off x="685800" y="4343400"/>
-            <a:ext cx="5484600" cy="4113000"/>
+            <a:ext cx="5484240" cy="4112640"/>
           </a:xfrm>
           <a:prstGeom prst="rect">
             <a:avLst/>
@@ -441,7 +413,7 @@
         <p:txBody>
           <a:bodyPr lIns="0" rIns="0" tIns="91440" bIns="91440"/>
           <a:p>
-            <a:pPr marL="216000" indent="-214920">
+            <a:pPr marL="216000" indent="-214560">
               <a:lnSpc>
                 <a:spcPct val="100000"/>
               </a:lnSpc>
@@ -499,7 +471,7 @@
       </p:grpSpPr>
       <p:sp>
         <p:nvSpPr>
-          <p:cNvPr id="108" name="PlaceHolder 1"/>
+          <p:cNvPr id="110" name="PlaceHolder 1"/>
           <p:cNvSpPr>
             <a:spLocks noGrp="1"/>
           </p:cNvSpPr>
@@ -510,7 +482,7 @@
         <p:spPr>
           <a:xfrm>
             <a:off x="685800" y="4343400"/>
-            <a:ext cx="5484600" cy="4113000"/>
+            <a:ext cx="5484240" cy="4112640"/>
           </a:xfrm>
           <a:prstGeom prst="rect">
             <a:avLst/>
@@ -519,7 +491,7 @@
         <p:txBody>
           <a:bodyPr lIns="0" rIns="0" tIns="91440" bIns="91440"/>
           <a:p>
-            <a:pPr marL="216000" indent="-214920">
+            <a:pPr marL="216000" indent="-214560">
               <a:lnSpc>
                 <a:spcPct val="100000"/>
               </a:lnSpc>
@@ -577,7 +549,7 @@
       </p:grpSpPr>
       <p:sp>
         <p:nvSpPr>
-          <p:cNvPr id="109" name="PlaceHolder 1"/>
+          <p:cNvPr id="111" name="PlaceHolder 1"/>
           <p:cNvSpPr>
             <a:spLocks noGrp="1"/>
           </p:cNvSpPr>
@@ -588,7 +560,7 @@
         <p:spPr>
           <a:xfrm>
             <a:off x="685800" y="4343400"/>
-            <a:ext cx="5484600" cy="4113000"/>
+            <a:ext cx="5484240" cy="4112640"/>
           </a:xfrm>
           <a:prstGeom prst="rect">
             <a:avLst/>
@@ -597,7 +569,7 @@
         <p:txBody>
           <a:bodyPr lIns="0" rIns="0" tIns="91440" bIns="91440"/>
           <a:p>
-            <a:pPr marL="216000" indent="-214920">
+            <a:pPr marL="216000" indent="-214560">
               <a:lnSpc>
                 <a:spcPct val="100000"/>
               </a:lnSpc>
@@ -4006,105 +3978,7 @@
                 </a:uFill>
                 <a:latin typeface="Arial"/>
               </a:rPr>
-              <a:t>Click </a:t>
-            </a:r>
-            <a:r>
-              <a:rPr b="0" lang="en-IN" sz="4400" spc="-1" strike="noStrike">
-                <a:solidFill>
-                  <a:srgbClr val="000000"/>
-                </a:solidFill>
-                <a:uFill>
-                  <a:solidFill>
-                    <a:srgbClr val="ffffff"/>
-                  </a:solidFill>
-                </a:uFill>
-                <a:latin typeface="Arial"/>
-              </a:rPr>
-              <a:t>to </a:t>
-            </a:r>
-            <a:r>
-              <a:rPr b="0" lang="en-IN" sz="4400" spc="-1" strike="noStrike">
-                <a:solidFill>
-                  <a:srgbClr val="000000"/>
-                </a:solidFill>
-                <a:uFill>
-                  <a:solidFill>
-                    <a:srgbClr val="ffffff"/>
-                  </a:solidFill>
-                </a:uFill>
-                <a:latin typeface="Arial"/>
-              </a:rPr>
-              <a:t>edit </a:t>
-            </a:r>
-            <a:r>
-              <a:rPr b="0" lang="en-IN" sz="4400" spc="-1" strike="noStrike">
-                <a:solidFill>
-                  <a:srgbClr val="000000"/>
-                </a:solidFill>
-                <a:uFill>
-                  <a:solidFill>
-                    <a:srgbClr val="ffffff"/>
-                  </a:solidFill>
-                </a:uFill>
-                <a:latin typeface="Arial"/>
-              </a:rPr>
-              <a:t>the </a:t>
-            </a:r>
-            <a:r>
-              <a:rPr b="0" lang="en-IN" sz="4400" spc="-1" strike="noStrike">
-                <a:solidFill>
-                  <a:srgbClr val="000000"/>
-                </a:solidFill>
-                <a:uFill>
-                  <a:solidFill>
-                    <a:srgbClr val="ffffff"/>
-                  </a:solidFill>
-                </a:uFill>
-                <a:latin typeface="Arial"/>
-              </a:rPr>
-              <a:t>title </a:t>
-            </a:r>
-            <a:r>
-              <a:rPr b="0" lang="en-IN" sz="4400" spc="-1" strike="noStrike">
-                <a:solidFill>
-                  <a:srgbClr val="000000"/>
-                </a:solidFill>
-                <a:uFill>
-                  <a:solidFill>
-                    <a:srgbClr val="ffffff"/>
-                  </a:solidFill>
-                </a:uFill>
-                <a:latin typeface="Arial"/>
-              </a:rPr>
-              <a:t>text </a:t>
-            </a:r>
-            <a:r>
-              <a:rPr b="0" lang="en-IN" sz="4400" spc="-1" strike="noStrike">
-                <a:solidFill>
-                  <a:srgbClr val="000000"/>
-                </a:solidFill>
-                <a:uFill>
-                  <a:solidFill>
-                    <a:srgbClr val="ffffff"/>
-                  </a:solidFill>
-                </a:uFill>
-                <a:latin typeface="Arial"/>
-              </a:rPr>
-              <a:t>forma</a:t>
-            </a:r>
-            <a:r>
-              <a:rPr b="0" lang="en-IN" sz="4400" spc="-1" strike="noStrike">
-                <a:solidFill>
-                  <a:srgbClr val="000000"/>
-                </a:solidFill>
-                <a:uFill>
-                  <a:solidFill>
-                    <a:srgbClr val="ffffff"/>
-                  </a:solidFill>
-                </a:uFill>
-                <a:latin typeface="Arial"/>
-              </a:rPr>
-              <a:t>t</a:t>
+              <a:t>Click to edit the title text format</a:t>
             </a:r>
             <a:endParaRPr b="0" lang="en-IN" sz="4400" spc="-1" strike="noStrike">
               <a:solidFill>
@@ -4434,7 +4308,7 @@
         <p:spPr>
           <a:xfrm>
             <a:off x="311760" y="744480"/>
-            <a:ext cx="8518680" cy="2050920"/>
+            <a:ext cx="8518320" cy="2050560"/>
           </a:xfrm>
           <a:prstGeom prst="rect">
             <a:avLst/>
@@ -4496,7 +4370,7 @@
         <p:spPr>
           <a:xfrm>
             <a:off x="288000" y="4176000"/>
-            <a:ext cx="8518680" cy="790920"/>
+            <a:ext cx="8518320" cy="790560"/>
           </a:xfrm>
           <a:prstGeom prst="rect">
             <a:avLst/>
@@ -4515,7 +4389,7 @@
         <p:txBody>
           <a:bodyPr lIns="90000" rIns="90000" tIns="91440" bIns="91440"/>
           <a:p>
-            <a:pPr marL="457200" indent="-341280" algn="ctr">
+            <a:pPr marL="457200" indent="-340920" algn="ctr">
               <a:lnSpc>
                 <a:spcPct val="100000"/>
               </a:lnSpc>
@@ -4607,7 +4481,7 @@
         <p:spPr>
           <a:xfrm>
             <a:off x="288000" y="75600"/>
-            <a:ext cx="8518680" cy="570960"/>
+            <a:ext cx="8518320" cy="570600"/>
           </a:xfrm>
           <a:prstGeom prst="rect">
             <a:avLst/>
@@ -4669,7 +4543,7 @@
         <p:spPr>
           <a:xfrm>
             <a:off x="311760" y="1152360"/>
-            <a:ext cx="8518680" cy="3414600"/>
+            <a:ext cx="8518320" cy="3414240"/>
           </a:xfrm>
           <a:prstGeom prst="rect">
             <a:avLst/>
@@ -4963,7 +4837,7 @@
         <p:spPr>
           <a:xfrm>
             <a:off x="288000" y="75600"/>
-            <a:ext cx="8518680" cy="570960"/>
+            <a:ext cx="8518320" cy="570600"/>
           </a:xfrm>
           <a:prstGeom prst="rect">
             <a:avLst/>
@@ -5025,7 +4899,7 @@
         <p:spPr>
           <a:xfrm>
             <a:off x="3168000" y="864000"/>
-            <a:ext cx="2949840" cy="573840"/>
+            <a:ext cx="2949480" cy="573480"/>
           </a:xfrm>
           <a:prstGeom prst="rect">
             <a:avLst/>
@@ -5091,7 +4965,7 @@
         <p:spPr>
           <a:xfrm>
             <a:off x="1153080" y="2016000"/>
-            <a:ext cx="2013840" cy="718920"/>
+            <a:ext cx="2013480" cy="718560"/>
           </a:xfrm>
           <a:prstGeom prst="rect">
             <a:avLst/>
@@ -5121,7 +4995,7 @@
         <p:spPr>
           <a:xfrm>
             <a:off x="1512000" y="2223360"/>
-            <a:ext cx="1438920" cy="259560"/>
+            <a:ext cx="1438560" cy="259200"/>
           </a:xfrm>
           <a:prstGeom prst="rect">
             <a:avLst/>
@@ -5183,7 +5057,7 @@
         <p:spPr>
           <a:xfrm>
             <a:off x="3601080" y="2016000"/>
-            <a:ext cx="2013840" cy="718920"/>
+            <a:ext cx="2013480" cy="718560"/>
           </a:xfrm>
           <a:prstGeom prst="rect">
             <a:avLst/>
@@ -5213,7 +5087,7 @@
         <p:spPr>
           <a:xfrm>
             <a:off x="3960000" y="2223360"/>
-            <a:ext cx="1438920" cy="259560"/>
+            <a:ext cx="1438560" cy="259200"/>
           </a:xfrm>
           <a:prstGeom prst="rect">
             <a:avLst/>
@@ -5275,7 +5149,7 @@
         <p:spPr>
           <a:xfrm>
             <a:off x="6120000" y="2016000"/>
-            <a:ext cx="2013840" cy="718920"/>
+            <a:ext cx="2013480" cy="718560"/>
           </a:xfrm>
           <a:prstGeom prst="rect">
             <a:avLst/>
@@ -5305,7 +5179,7 @@
         <p:spPr>
           <a:xfrm>
             <a:off x="6478920" y="2223360"/>
-            <a:ext cx="1438920" cy="259560"/>
+            <a:ext cx="1438560" cy="259200"/>
           </a:xfrm>
           <a:prstGeom prst="rect">
             <a:avLst/>
@@ -5367,7 +5241,7 @@
         <p:spPr>
           <a:xfrm rot="2796600">
             <a:off x="2952000" y="1439280"/>
-            <a:ext cx="142920" cy="574920"/>
+            <a:ext cx="142560" cy="574560"/>
           </a:xfrm>
           <a:custGeom>
             <a:avLst/>
@@ -5437,7 +5311,7 @@
         <p:spPr>
           <a:xfrm>
             <a:off x="4464000" y="1512000"/>
-            <a:ext cx="142920" cy="430920"/>
+            <a:ext cx="142560" cy="430560"/>
           </a:xfrm>
           <a:custGeom>
             <a:avLst/>
@@ -5506,8 +5380,8 @@
         </p:nvSpPr>
         <p:spPr>
           <a:xfrm rot="19097400">
-            <a:off x="6190920" y="1511640"/>
-            <a:ext cx="142920" cy="430920"/>
+            <a:off x="6190560" y="1511640"/>
+            <a:ext cx="142560" cy="430560"/>
           </a:xfrm>
           <a:custGeom>
             <a:avLst/>
@@ -5577,7 +5451,7 @@
         <p:spPr>
           <a:xfrm>
             <a:off x="2448000" y="1512000"/>
-            <a:ext cx="286920" cy="286920"/>
+            <a:ext cx="286560" cy="286560"/>
           </a:xfrm>
           <a:prstGeom prst="ellipse">
             <a:avLst/>
@@ -5643,7 +5517,7 @@
         <p:spPr>
           <a:xfrm>
             <a:off x="4104000" y="1584000"/>
-            <a:ext cx="286920" cy="286920"/>
+            <a:ext cx="286560" cy="286560"/>
           </a:xfrm>
           <a:prstGeom prst="ellipse">
             <a:avLst/>
@@ -5709,7 +5583,7 @@
         <p:spPr>
           <a:xfrm>
             <a:off x="6461280" y="1518840"/>
-            <a:ext cx="286920" cy="286920"/>
+            <a:ext cx="286560" cy="286560"/>
           </a:xfrm>
           <a:prstGeom prst="ellipse">
             <a:avLst/>
@@ -5775,7 +5649,7 @@
         <p:spPr>
           <a:xfrm>
             <a:off x="648000" y="3168000"/>
-            <a:ext cx="286920" cy="286920"/>
+            <a:ext cx="286560" cy="286560"/>
           </a:xfrm>
           <a:prstGeom prst="ellipse">
             <a:avLst/>
@@ -5841,7 +5715,7 @@
         <p:spPr>
           <a:xfrm>
             <a:off x="1008000" y="3145680"/>
-            <a:ext cx="4594680" cy="345240"/>
+            <a:ext cx="4594320" cy="344880"/>
           </a:xfrm>
           <a:prstGeom prst="rect">
             <a:avLst/>
@@ -5898,7 +5772,7 @@
         <p:spPr>
           <a:xfrm>
             <a:off x="648000" y="3708000"/>
-            <a:ext cx="286920" cy="286920"/>
+            <a:ext cx="286560" cy="286560"/>
           </a:xfrm>
           <a:prstGeom prst="ellipse">
             <a:avLst/>
@@ -5964,7 +5838,7 @@
         <p:spPr>
           <a:xfrm>
             <a:off x="1008000" y="3685680"/>
-            <a:ext cx="5196600" cy="345240"/>
+            <a:ext cx="5196240" cy="344880"/>
           </a:xfrm>
           <a:prstGeom prst="rect">
             <a:avLst/>
@@ -6036,7 +5910,7 @@
         <p:spPr>
           <a:xfrm>
             <a:off x="660240" y="4270320"/>
-            <a:ext cx="286920" cy="286920"/>
+            <a:ext cx="286560" cy="286560"/>
           </a:xfrm>
           <a:prstGeom prst="ellipse">
             <a:avLst/>
@@ -6102,7 +5976,7 @@
         <p:spPr>
           <a:xfrm>
             <a:off x="1020240" y="4248000"/>
-            <a:ext cx="5301720" cy="345240"/>
+            <a:ext cx="5301360" cy="344880"/>
           </a:xfrm>
           <a:prstGeom prst="rect">
             <a:avLst/>
@@ -6208,7 +6082,7 @@
         <p:spPr>
           <a:xfrm>
             <a:off x="288000" y="75600"/>
-            <a:ext cx="8518680" cy="570960"/>
+            <a:ext cx="8518320" cy="570600"/>
           </a:xfrm>
           <a:prstGeom prst="rect">
             <a:avLst/>
@@ -6270,7 +6144,7 @@
         <p:spPr>
           <a:xfrm>
             <a:off x="432000" y="661680"/>
-            <a:ext cx="7919640" cy="1113840"/>
+            <a:ext cx="7919280" cy="1113480"/>
           </a:xfrm>
           <a:prstGeom prst="rect">
             <a:avLst/>
@@ -6300,6 +6174,7 @@
                   </a:solidFill>
                 </a:uFill>
                 <a:latin typeface="Arial"/>
+                <a:ea typeface="DejaVu Sans"/>
               </a:rPr>
               <a:t>API:</a:t>
             </a:r>
@@ -6314,6 +6189,7 @@
                   </a:solidFill>
                 </a:uFill>
                 <a:latin typeface="Arial"/>
+                <a:ea typeface="DejaVu Sans"/>
               </a:rPr>
               <a:t>  /apm/v1/tenants/{tenant_id}/packages/upload</a:t>
             </a:r>
@@ -6341,6 +6217,7 @@
                   </a:solidFill>
                 </a:uFill>
                 <a:latin typeface="Arial"/>
+                <a:ea typeface="DejaVu Sans"/>
               </a:rPr>
               <a:t>Method: </a:t>
             </a:r>
@@ -6355,6 +6232,7 @@
                   </a:solidFill>
                 </a:uFill>
                 <a:latin typeface="Arial"/>
+                <a:ea typeface="DejaVu Sans"/>
               </a:rPr>
               <a:t>POST</a:t>
             </a:r>
@@ -6382,6 +6260,7 @@
                   </a:solidFill>
                 </a:uFill>
                 <a:latin typeface="Arial"/>
+                <a:ea typeface="DejaVu Sans"/>
               </a:rPr>
               <a:t>Parameters:</a:t>
             </a:r>
@@ -6420,7 +6299,7 @@
         </p:nvGraphicFramePr>
         <p:xfrm>
           <a:off x="504000" y="1584000"/>
-          <a:ext cx="8351640" cy="3385440"/>
+          <a:ext cx="8351640" cy="3385080"/>
         </p:xfrm>
         <a:graphic>
           <a:graphicData uri="http://schemas.openxmlformats.org/drawingml/2006/table">
@@ -7815,7 +7694,7 @@
                   </a:tcPr>
                 </a:tc>
               </a:tr>
-              <a:tr h="305280">
+              <a:tr h="304920">
                 <a:tc>
                   <a:txBody>
                     <a:bodyPr lIns="90000" rIns="90000"/>
@@ -8050,7 +7929,7 @@
         <p:spPr>
           <a:xfrm>
             <a:off x="288000" y="75600"/>
-            <a:ext cx="8518680" cy="570960"/>
+            <a:ext cx="8518320" cy="570600"/>
           </a:xfrm>
           <a:prstGeom prst="rect">
             <a:avLst/>
@@ -8103,6 +7982,47 @@
           </a:p>
         </p:txBody>
       </p:sp>
+      <p:graphicFrame>
+        <p:nvGraphicFramePr>
+          <p:cNvPr id="105" name="Object 2"/>
+          <p:cNvGraphicFramePr/>
+          <p:nvPr/>
+        </p:nvGraphicFramePr>
+        <p:xfrm>
+          <a:off x="3547800" y="2168280"/>
+          <a:ext cx="2047680" cy="806400"/>
+        </p:xfrm>
+        <a:graphic>
+          <a:graphicData uri="http://schemas.openxmlformats.org/presentationml/2006/ole">
+            <p:oleObj progId="Excel.Sheet.12" r:id="rId1" spid="">
+              <p:embed/>
+              <p:pic>
+                <p:nvPicPr>
+                  <p:cNvPr id="106" name="" descr=""/>
+                  <p:cNvPicPr/>
+                  <p:nvPr/>
+                </p:nvPicPr>
+                <p:blipFill>
+                  <a:blip r:embed="rId2"/>
+                  <a:stretch/>
+                </p:blipFill>
+                <p:spPr>
+                  <a:xfrm>
+                    <a:off x="3547800" y="2168280"/>
+                    <a:ext cx="2047680" cy="806400"/>
+                  </a:xfrm>
+                  <a:prstGeom prst="rect">
+                    <a:avLst/>
+                  </a:prstGeom>
+                  <a:ln>
+                    <a:noFill/>
+                  </a:ln>
+                </p:spPr>
+              </p:pic>
+            </p:oleObj>
+          </a:graphicData>
+        </a:graphic>
+      </p:graphicFrame>
     </p:spTree>
   </p:cSld>
   <p:timing>
@@ -8154,14 +8074,14 @@
       </p:grpSpPr>
       <p:sp>
         <p:nvSpPr>
-          <p:cNvPr id="105" name="CustomShape 1"/>
+          <p:cNvPr id="107" name="CustomShape 1"/>
           <p:cNvSpPr/>
           <p:nvPr/>
         </p:nvSpPr>
         <p:spPr>
           <a:xfrm>
             <a:off x="242280" y="2571840"/>
-            <a:ext cx="8518680" cy="570960"/>
+            <a:ext cx="8518320" cy="570600"/>
           </a:xfrm>
           <a:prstGeom prst="rect">
             <a:avLst/>

</xml_diff>

<commit_message>
updated with appPkgId and appId response
</commit_message>
<xml_diff>
--- a/MECM PT/Release V1.0/ATP MECM Integration.pptx
+++ b/MECM PT/Release V1.0/ATP MECM Integration.pptx
@@ -15,6 +15,7 @@
     <p:sldId id="259" r:id="rId8"/>
     <p:sldId id="260" r:id="rId9"/>
     <p:sldId id="261" r:id="rId10"/>
+    <p:sldId id="262" r:id="rId11"/>
   </p:sldIdLst>
   <p:sldSz cx="9144000" cy="5143500"/>
   <p:notesSz cx="6858000" cy="9144000"/>
@@ -262,7 +263,7 @@
           <a:bodyPr lIns="0" rIns="0" tIns="0" bIns="0" anchor="b"/>
           <a:p>
             <a:pPr algn="r"/>
-            <a:fld id="{367F26C6-7DFB-43C6-8C8F-69ED72EB03C2}" type="slidenum">
+            <a:fld id="{2DFC5D2E-91EF-4697-96A8-1C2CE3B6EF57}" type="slidenum">
               <a:rPr b="0" lang="en-IN" sz="1400" spc="-1" strike="noStrike">
                 <a:solidFill>
                   <a:srgbClr val="000000"/>
@@ -315,7 +316,7 @@
       </p:grpSpPr>
       <p:sp>
         <p:nvSpPr>
-          <p:cNvPr id="108" name="PlaceHolder 1"/>
+          <p:cNvPr id="111" name="PlaceHolder 1"/>
           <p:cNvSpPr>
             <a:spLocks noGrp="1"/>
           </p:cNvSpPr>
@@ -326,7 +327,7 @@
         <p:spPr>
           <a:xfrm>
             <a:off x="685800" y="4343400"/>
-            <a:ext cx="5484240" cy="4112640"/>
+            <a:ext cx="5483880" cy="4112280"/>
           </a:xfrm>
           <a:prstGeom prst="rect">
             <a:avLst/>
@@ -335,7 +336,7 @@
         <p:txBody>
           <a:bodyPr lIns="0" rIns="0" tIns="91440" bIns="91440"/>
           <a:p>
-            <a:pPr marL="216000" indent="-214560">
+            <a:pPr marL="216000" indent="-214200">
               <a:lnSpc>
                 <a:spcPct val="100000"/>
               </a:lnSpc>
@@ -393,7 +394,7 @@
       </p:grpSpPr>
       <p:sp>
         <p:nvSpPr>
-          <p:cNvPr id="109" name="PlaceHolder 1"/>
+          <p:cNvPr id="112" name="PlaceHolder 1"/>
           <p:cNvSpPr>
             <a:spLocks noGrp="1"/>
           </p:cNvSpPr>
@@ -404,7 +405,7 @@
         <p:spPr>
           <a:xfrm>
             <a:off x="685800" y="4343400"/>
-            <a:ext cx="5484240" cy="4112640"/>
+            <a:ext cx="5483880" cy="4112280"/>
           </a:xfrm>
           <a:prstGeom prst="rect">
             <a:avLst/>
@@ -413,7 +414,7 @@
         <p:txBody>
           <a:bodyPr lIns="0" rIns="0" tIns="91440" bIns="91440"/>
           <a:p>
-            <a:pPr marL="216000" indent="-214560">
+            <a:pPr marL="216000" indent="-214200">
               <a:lnSpc>
                 <a:spcPct val="100000"/>
               </a:lnSpc>
@@ -471,7 +472,7 @@
       </p:grpSpPr>
       <p:sp>
         <p:nvSpPr>
-          <p:cNvPr id="110" name="PlaceHolder 1"/>
+          <p:cNvPr id="113" name="PlaceHolder 1"/>
           <p:cNvSpPr>
             <a:spLocks noGrp="1"/>
           </p:cNvSpPr>
@@ -482,7 +483,7 @@
         <p:spPr>
           <a:xfrm>
             <a:off x="685800" y="4343400"/>
-            <a:ext cx="5484240" cy="4112640"/>
+            <a:ext cx="5483880" cy="4112280"/>
           </a:xfrm>
           <a:prstGeom prst="rect">
             <a:avLst/>
@@ -491,7 +492,7 @@
         <p:txBody>
           <a:bodyPr lIns="0" rIns="0" tIns="91440" bIns="91440"/>
           <a:p>
-            <a:pPr marL="216000" indent="-214560">
+            <a:pPr marL="216000" indent="-214200">
               <a:lnSpc>
                 <a:spcPct val="100000"/>
               </a:lnSpc>
@@ -549,7 +550,7 @@
       </p:grpSpPr>
       <p:sp>
         <p:nvSpPr>
-          <p:cNvPr id="111" name="PlaceHolder 1"/>
+          <p:cNvPr id="114" name="PlaceHolder 1"/>
           <p:cNvSpPr>
             <a:spLocks noGrp="1"/>
           </p:cNvSpPr>
@@ -560,7 +561,7 @@
         <p:spPr>
           <a:xfrm>
             <a:off x="685800" y="4343400"/>
-            <a:ext cx="5484240" cy="4112640"/>
+            <a:ext cx="5483880" cy="4112280"/>
           </a:xfrm>
           <a:prstGeom prst="rect">
             <a:avLst/>
@@ -569,7 +570,85 @@
         <p:txBody>
           <a:bodyPr lIns="0" rIns="0" tIns="91440" bIns="91440"/>
           <a:p>
-            <a:pPr marL="216000" indent="-214560">
+            <a:pPr marL="216000" indent="-214200">
+              <a:lnSpc>
+                <a:spcPct val="100000"/>
+              </a:lnSpc>
+            </a:pPr>
+            <a:r>
+              <a:rPr b="0" lang="en-IN" sz="1100" spc="-1" strike="noStrike" u="sng">
+                <a:solidFill>
+                  <a:srgbClr val="000000"/>
+                </a:solidFill>
+                <a:uFill>
+                  <a:solidFill>
+                    <a:srgbClr val="ffffff"/>
+                  </a:solidFill>
+                </a:uFill>
+                <a:latin typeface="Arial"/>
+                <a:hlinkClick r:id="rId1"/>
+              </a:rPr>
+              <a:t>https://gitee.com/edgegallery/community/blob/master/Security%20WG/Tutorials/Gitee%20Pull%20Request%20Compliance%20Verification.md</a:t>
+            </a:r>
+            <a:endParaRPr b="0" lang="en-IN" sz="2000" spc="-1" strike="noStrike">
+              <a:solidFill>
+                <a:srgbClr val="000000"/>
+              </a:solidFill>
+              <a:uFill>
+                <a:solidFill>
+                  <a:srgbClr val="ffffff"/>
+                </a:solidFill>
+              </a:uFill>
+              <a:latin typeface="Arial"/>
+            </a:endParaRPr>
+          </a:p>
+        </p:txBody>
+      </p:sp>
+    </p:spTree>
+  </p:cSld>
+</p:notes>
+</file>
+
+<file path=ppt/notesSlides/notesSlide6.xml><?xml version="1.0" encoding="utf-8"?>
+<p:notes xmlns:a="http://schemas.openxmlformats.org/drawingml/2006/main" xmlns:p="http://schemas.openxmlformats.org/presentationml/2006/main" xmlns:r="http://schemas.openxmlformats.org/officeDocument/2006/relationships" xmlns:p14="http://schemas.microsoft.com/office/powerpoint/2010/main" xmlns:p15="http://schemas.microsoft.com/office/powerpoint/2012/main" xmlns:mc="http://schemas.openxmlformats.org/markup-compatibility/2006">
+  <p:cSld>
+    <p:spTree>
+      <p:nvGrpSpPr>
+        <p:cNvPr id="1" name=""/>
+        <p:cNvGrpSpPr/>
+        <p:nvPr/>
+      </p:nvGrpSpPr>
+      <p:grpSpPr>
+        <a:xfrm>
+          <a:off x="0" y="0"/>
+          <a:ext cx="0" cy="0"/>
+          <a:chOff x="0" y="0"/>
+          <a:chExt cx="0" cy="0"/>
+        </a:xfrm>
+      </p:grpSpPr>
+      <p:sp>
+        <p:nvSpPr>
+          <p:cNvPr id="115" name="PlaceHolder 1"/>
+          <p:cNvSpPr>
+            <a:spLocks noGrp="1"/>
+          </p:cNvSpPr>
+          <p:nvPr>
+            <p:ph type="body"/>
+          </p:nvPr>
+        </p:nvSpPr>
+        <p:spPr>
+          <a:xfrm>
+            <a:off x="685800" y="4343400"/>
+            <a:ext cx="5483880" cy="4112280"/>
+          </a:xfrm>
+          <a:prstGeom prst="rect">
+            <a:avLst/>
+          </a:prstGeom>
+        </p:spPr>
+        <p:txBody>
+          <a:bodyPr lIns="0" rIns="0" tIns="91440" bIns="91440"/>
+          <a:p>
+            <a:pPr marL="216000" indent="-214200">
               <a:lnSpc>
                 <a:spcPct val="100000"/>
               </a:lnSpc>
@@ -4308,7 +4387,7 @@
         <p:spPr>
           <a:xfrm>
             <a:off x="311760" y="744480"/>
-            <a:ext cx="8518320" cy="2050560"/>
+            <a:ext cx="8517960" cy="2050200"/>
           </a:xfrm>
           <a:prstGeom prst="rect">
             <a:avLst/>
@@ -4370,7 +4449,7 @@
         <p:spPr>
           <a:xfrm>
             <a:off x="288000" y="4176000"/>
-            <a:ext cx="8518320" cy="790560"/>
+            <a:ext cx="8517960" cy="790200"/>
           </a:xfrm>
           <a:prstGeom prst="rect">
             <a:avLst/>
@@ -4389,7 +4468,7 @@
         <p:txBody>
           <a:bodyPr lIns="90000" rIns="90000" tIns="91440" bIns="91440"/>
           <a:p>
-            <a:pPr marL="457200" indent="-340920" algn="ctr">
+            <a:pPr marL="457200" indent="-340560" algn="ctr">
               <a:lnSpc>
                 <a:spcPct val="100000"/>
               </a:lnSpc>
@@ -4481,7 +4560,7 @@
         <p:spPr>
           <a:xfrm>
             <a:off x="288000" y="75600"/>
-            <a:ext cx="8518320" cy="570600"/>
+            <a:ext cx="8517960" cy="570240"/>
           </a:xfrm>
           <a:prstGeom prst="rect">
             <a:avLst/>
@@ -4543,7 +4622,7 @@
         <p:spPr>
           <a:xfrm>
             <a:off x="311760" y="1152360"/>
-            <a:ext cx="8518320" cy="3414240"/>
+            <a:ext cx="8517960" cy="3413880"/>
           </a:xfrm>
           <a:prstGeom prst="rect">
             <a:avLst/>
@@ -4837,7 +4916,7 @@
         <p:spPr>
           <a:xfrm>
             <a:off x="288000" y="75600"/>
-            <a:ext cx="8518320" cy="570600"/>
+            <a:ext cx="8517960" cy="570240"/>
           </a:xfrm>
           <a:prstGeom prst="rect">
             <a:avLst/>
@@ -4899,7 +4978,7 @@
         <p:spPr>
           <a:xfrm>
             <a:off x="3168000" y="864000"/>
-            <a:ext cx="2949480" cy="573480"/>
+            <a:ext cx="2949120" cy="573120"/>
           </a:xfrm>
           <a:prstGeom prst="rect">
             <a:avLst/>
@@ -4965,7 +5044,7 @@
         <p:spPr>
           <a:xfrm>
             <a:off x="1153080" y="2016000"/>
-            <a:ext cx="2013480" cy="718560"/>
+            <a:ext cx="2013120" cy="718200"/>
           </a:xfrm>
           <a:prstGeom prst="rect">
             <a:avLst/>
@@ -4995,7 +5074,7 @@
         <p:spPr>
           <a:xfrm>
             <a:off x="1512000" y="2223360"/>
-            <a:ext cx="1438560" cy="259200"/>
+            <a:ext cx="1438200" cy="258840"/>
           </a:xfrm>
           <a:prstGeom prst="rect">
             <a:avLst/>
@@ -5057,7 +5136,7 @@
         <p:spPr>
           <a:xfrm>
             <a:off x="3601080" y="2016000"/>
-            <a:ext cx="2013480" cy="718560"/>
+            <a:ext cx="2013120" cy="718200"/>
           </a:xfrm>
           <a:prstGeom prst="rect">
             <a:avLst/>
@@ -5087,7 +5166,7 @@
         <p:spPr>
           <a:xfrm>
             <a:off x="3960000" y="2223360"/>
-            <a:ext cx="1438560" cy="259200"/>
+            <a:ext cx="1438200" cy="258840"/>
           </a:xfrm>
           <a:prstGeom prst="rect">
             <a:avLst/>
@@ -5149,7 +5228,7 @@
         <p:spPr>
           <a:xfrm>
             <a:off x="6120000" y="2016000"/>
-            <a:ext cx="2013480" cy="718560"/>
+            <a:ext cx="2013120" cy="718200"/>
           </a:xfrm>
           <a:prstGeom prst="rect">
             <a:avLst/>
@@ -5179,7 +5258,7 @@
         <p:spPr>
           <a:xfrm>
             <a:off x="6478920" y="2223360"/>
-            <a:ext cx="1438560" cy="259200"/>
+            <a:ext cx="1438200" cy="258840"/>
           </a:xfrm>
           <a:prstGeom prst="rect">
             <a:avLst/>
@@ -5240,8 +5319,8 @@
         </p:nvSpPr>
         <p:spPr>
           <a:xfrm rot="2796600">
-            <a:off x="2952000" y="1439280"/>
-            <a:ext cx="142560" cy="574560"/>
+            <a:off x="2952000" y="1438920"/>
+            <a:ext cx="142200" cy="574200"/>
           </a:xfrm>
           <a:custGeom>
             <a:avLst/>
@@ -5311,7 +5390,7 @@
         <p:spPr>
           <a:xfrm>
             <a:off x="4464000" y="1512000"/>
-            <a:ext cx="142560" cy="430560"/>
+            <a:ext cx="142200" cy="430200"/>
           </a:xfrm>
           <a:custGeom>
             <a:avLst/>
@@ -5380,8 +5459,8 @@
         </p:nvSpPr>
         <p:spPr>
           <a:xfrm rot="19097400">
-            <a:off x="6190560" y="1511640"/>
-            <a:ext cx="142560" cy="430560"/>
+            <a:off x="6190200" y="1511640"/>
+            <a:ext cx="142200" cy="430200"/>
           </a:xfrm>
           <a:custGeom>
             <a:avLst/>
@@ -5451,7 +5530,7 @@
         <p:spPr>
           <a:xfrm>
             <a:off x="2448000" y="1512000"/>
-            <a:ext cx="286560" cy="286560"/>
+            <a:ext cx="286200" cy="286200"/>
           </a:xfrm>
           <a:prstGeom prst="ellipse">
             <a:avLst/>
@@ -5517,7 +5596,7 @@
         <p:spPr>
           <a:xfrm>
             <a:off x="4104000" y="1584000"/>
-            <a:ext cx="286560" cy="286560"/>
+            <a:ext cx="286200" cy="286200"/>
           </a:xfrm>
           <a:prstGeom prst="ellipse">
             <a:avLst/>
@@ -5583,7 +5662,7 @@
         <p:spPr>
           <a:xfrm>
             <a:off x="6461280" y="1518840"/>
-            <a:ext cx="286560" cy="286560"/>
+            <a:ext cx="286200" cy="286200"/>
           </a:xfrm>
           <a:prstGeom prst="ellipse">
             <a:avLst/>
@@ -5649,7 +5728,7 @@
         <p:spPr>
           <a:xfrm>
             <a:off x="648000" y="3168000"/>
-            <a:ext cx="286560" cy="286560"/>
+            <a:ext cx="286200" cy="286200"/>
           </a:xfrm>
           <a:prstGeom prst="ellipse">
             <a:avLst/>
@@ -5715,7 +5794,7 @@
         <p:spPr>
           <a:xfrm>
             <a:off x="1008000" y="3145680"/>
-            <a:ext cx="4594320" cy="344880"/>
+            <a:ext cx="4593960" cy="344520"/>
           </a:xfrm>
           <a:prstGeom prst="rect">
             <a:avLst/>
@@ -5772,7 +5851,7 @@
         <p:spPr>
           <a:xfrm>
             <a:off x="648000" y="3708000"/>
-            <a:ext cx="286560" cy="286560"/>
+            <a:ext cx="286200" cy="286200"/>
           </a:xfrm>
           <a:prstGeom prst="ellipse">
             <a:avLst/>
@@ -5838,7 +5917,7 @@
         <p:spPr>
           <a:xfrm>
             <a:off x="1008000" y="3685680"/>
-            <a:ext cx="5196240" cy="344880"/>
+            <a:ext cx="5195880" cy="344520"/>
           </a:xfrm>
           <a:prstGeom prst="rect">
             <a:avLst/>
@@ -5910,7 +5989,7 @@
         <p:spPr>
           <a:xfrm>
             <a:off x="660240" y="4270320"/>
-            <a:ext cx="286560" cy="286560"/>
+            <a:ext cx="286200" cy="286200"/>
           </a:xfrm>
           <a:prstGeom prst="ellipse">
             <a:avLst/>
@@ -5976,7 +6055,7 @@
         <p:spPr>
           <a:xfrm>
             <a:off x="1020240" y="4248000"/>
-            <a:ext cx="5301360" cy="344880"/>
+            <a:ext cx="5301000" cy="344520"/>
           </a:xfrm>
           <a:prstGeom prst="rect">
             <a:avLst/>
@@ -6082,7 +6161,7 @@
         <p:spPr>
           <a:xfrm>
             <a:off x="288000" y="75600"/>
-            <a:ext cx="8518320" cy="570600"/>
+            <a:ext cx="8517960" cy="570240"/>
           </a:xfrm>
           <a:prstGeom prst="rect">
             <a:avLst/>
@@ -6144,7 +6223,7 @@
         <p:spPr>
           <a:xfrm>
             <a:off x="432000" y="661680"/>
-            <a:ext cx="7919280" cy="1113480"/>
+            <a:ext cx="7918920" cy="1113120"/>
           </a:xfrm>
           <a:prstGeom prst="rect">
             <a:avLst/>
@@ -6299,7 +6378,7 @@
         </p:nvGraphicFramePr>
         <p:xfrm>
           <a:off x="504000" y="1584000"/>
-          <a:ext cx="8351640" cy="3385080"/>
+          <a:ext cx="8351640" cy="3384720"/>
         </p:xfrm>
         <a:graphic>
           <a:graphicData uri="http://schemas.openxmlformats.org/drawingml/2006/table">
@@ -6656,352 +6735,6 @@
                   </a:tcPr>
                 </a:tc>
               </a:tr>
-              <a:tr h="305640">
-                <a:tc>
-                  <a:txBody>
-                    <a:bodyPr lIns="90000" rIns="90000"/>
-                    <a:p>
-                      <a:r>
-                        <a:rPr b="0" lang="en-IN" sz="1500" spc="-1" strike="noStrike">
-                          <a:solidFill>
-                            <a:srgbClr val="000000"/>
-                          </a:solidFill>
-                          <a:uFill>
-                            <a:solidFill>
-                              <a:srgbClr val="ffffff"/>
-                            </a:solidFill>
-                          </a:uFill>
-                          <a:latin typeface="Arial"/>
-                        </a:rPr>
-                        <a:t>appId</a:t>
-                      </a:r>
-                      <a:endParaRPr b="0" lang="en-IN" sz="1800" spc="-1" strike="noStrike">
-                        <a:solidFill>
-                          <a:srgbClr val="000000"/>
-                        </a:solidFill>
-                        <a:uFill>
-                          <a:solidFill>
-                            <a:srgbClr val="ffffff"/>
-                          </a:solidFill>
-                        </a:uFill>
-                        <a:latin typeface="Arial"/>
-                      </a:endParaRPr>
-                    </a:p>
-                  </a:txBody>
-                  <a:tcPr marL="90000" marR="90000">
-                    <a:lnL w="720">
-                      <a:solidFill>
-                        <a:srgbClr val="ffffff"/>
-                      </a:solidFill>
-                    </a:lnL>
-                    <a:lnR w="720">
-                      <a:solidFill>
-                        <a:srgbClr val="ffffff"/>
-                      </a:solidFill>
-                    </a:lnR>
-                    <a:lnT w="720">
-                      <a:solidFill>
-                        <a:srgbClr val="ffffff"/>
-                      </a:solidFill>
-                    </a:lnT>
-                    <a:lnB w="720">
-                      <a:solidFill>
-                        <a:srgbClr val="ffffff"/>
-                      </a:solidFill>
-                    </a:lnB>
-                    <a:solidFill>
-                      <a:srgbClr val="ffffff"/>
-                    </a:solidFill>
-                  </a:tcPr>
-                </a:tc>
-                <a:tc>
-                  <a:txBody>
-                    <a:bodyPr lIns="90000" rIns="90000"/>
-                    <a:p>
-                      <a:r>
-                        <a:rPr b="0" lang="en-IN" sz="1500" spc="-1" strike="noStrike">
-                          <a:solidFill>
-                            <a:srgbClr val="000000"/>
-                          </a:solidFill>
-                          <a:uFill>
-                            <a:solidFill>
-                              <a:srgbClr val="ffffff"/>
-                            </a:solidFill>
-                          </a:uFill>
-                          <a:latin typeface="Arial"/>
-                        </a:rPr>
-                        <a:t>Request Param</a:t>
-                      </a:r>
-                      <a:endParaRPr b="0" lang="en-IN" sz="1800" spc="-1" strike="noStrike">
-                        <a:solidFill>
-                          <a:srgbClr val="000000"/>
-                        </a:solidFill>
-                        <a:uFill>
-                          <a:solidFill>
-                            <a:srgbClr val="ffffff"/>
-                          </a:solidFill>
-                        </a:uFill>
-                        <a:latin typeface="Arial"/>
-                      </a:endParaRPr>
-                    </a:p>
-                  </a:txBody>
-                  <a:tcPr marL="90000" marR="90000">
-                    <a:lnL w="720">
-                      <a:solidFill>
-                        <a:srgbClr val="ffffff"/>
-                      </a:solidFill>
-                    </a:lnL>
-                    <a:lnR w="720">
-                      <a:solidFill>
-                        <a:srgbClr val="ffffff"/>
-                      </a:solidFill>
-                    </a:lnR>
-                    <a:lnT w="720">
-                      <a:solidFill>
-                        <a:srgbClr val="ffffff"/>
-                      </a:solidFill>
-                    </a:lnT>
-                    <a:lnB w="720">
-                      <a:solidFill>
-                        <a:srgbClr val="ffffff"/>
-                      </a:solidFill>
-                    </a:lnB>
-                    <a:solidFill>
-                      <a:srgbClr val="ffffff"/>
-                    </a:solidFill>
-                  </a:tcPr>
-                </a:tc>
-                <a:tc>
-                  <a:txBody>
-                    <a:bodyPr lIns="90000" rIns="90000"/>
-                    <a:p>
-                      <a:r>
-                        <a:rPr b="0" lang="en-IN" sz="1500" spc="-1" strike="noStrike">
-                          <a:solidFill>
-                            <a:srgbClr val="000000"/>
-                          </a:solidFill>
-                          <a:uFill>
-                            <a:solidFill>
-                              <a:srgbClr val="ffffff"/>
-                            </a:solidFill>
-                          </a:uFill>
-                          <a:latin typeface="Arial"/>
-                        </a:rPr>
-                        <a:t>random value matching pattern [0-9a-f]{32}</a:t>
-                      </a:r>
-                      <a:endParaRPr b="0" lang="en-IN" sz="1800" spc="-1" strike="noStrike">
-                        <a:solidFill>
-                          <a:srgbClr val="000000"/>
-                        </a:solidFill>
-                        <a:uFill>
-                          <a:solidFill>
-                            <a:srgbClr val="ffffff"/>
-                          </a:solidFill>
-                        </a:uFill>
-                        <a:latin typeface="Arial"/>
-                      </a:endParaRPr>
-                    </a:p>
-                  </a:txBody>
-                  <a:tcPr marL="90000" marR="90000">
-                    <a:lnL w="720">
-                      <a:solidFill>
-                        <a:srgbClr val="ffffff"/>
-                      </a:solidFill>
-                    </a:lnL>
-                    <a:lnR w="720">
-                      <a:solidFill>
-                        <a:srgbClr val="ffffff"/>
-                      </a:solidFill>
-                    </a:lnR>
-                    <a:lnT w="720">
-                      <a:solidFill>
-                        <a:srgbClr val="ffffff"/>
-                      </a:solidFill>
-                    </a:lnT>
-                    <a:lnB w="720">
-                      <a:solidFill>
-                        <a:srgbClr val="ffffff"/>
-                      </a:solidFill>
-                    </a:lnB>
-                    <a:solidFill>
-                      <a:srgbClr val="ffffff"/>
-                    </a:solidFill>
-                  </a:tcPr>
-                </a:tc>
-              </a:tr>
-              <a:tr h="305640">
-                <a:tc>
-                  <a:txBody>
-                    <a:bodyPr lIns="90000" rIns="90000"/>
-                    <a:p>
-                      <a:r>
-                        <a:rPr b="0" lang="en-IN" sz="1500" spc="-1" strike="noStrike">
-                          <a:solidFill>
-                            <a:srgbClr val="000000"/>
-                          </a:solidFill>
-                          <a:uFill>
-                            <a:solidFill>
-                              <a:srgbClr val="ffffff"/>
-                            </a:solidFill>
-                          </a:uFill>
-                          <a:latin typeface="Arial"/>
-                        </a:rPr>
-                        <a:t>appPackageId</a:t>
-                      </a:r>
-                      <a:endParaRPr b="0" lang="en-IN" sz="1800" spc="-1" strike="noStrike">
-                        <a:solidFill>
-                          <a:srgbClr val="000000"/>
-                        </a:solidFill>
-                        <a:uFill>
-                          <a:solidFill>
-                            <a:srgbClr val="ffffff"/>
-                          </a:solidFill>
-                        </a:uFill>
-                        <a:latin typeface="Arial"/>
-                      </a:endParaRPr>
-                    </a:p>
-                  </a:txBody>
-                  <a:tcPr marL="90000" marR="90000">
-                    <a:lnL w="720">
-                      <a:solidFill>
-                        <a:srgbClr val="ffffff"/>
-                      </a:solidFill>
-                    </a:lnL>
-                    <a:lnR w="720">
-                      <a:solidFill>
-                        <a:srgbClr val="ffffff"/>
-                      </a:solidFill>
-                    </a:lnR>
-                    <a:lnT w="720">
-                      <a:solidFill>
-                        <a:srgbClr val="ffffff"/>
-                      </a:solidFill>
-                    </a:lnT>
-                    <a:lnB w="720">
-                      <a:solidFill>
-                        <a:srgbClr val="ffffff"/>
-                      </a:solidFill>
-                    </a:lnB>
-                    <a:solidFill>
-                      <a:srgbClr val="e6e6ff"/>
-                    </a:solidFill>
-                  </a:tcPr>
-                </a:tc>
-                <a:tc>
-                  <a:txBody>
-                    <a:bodyPr lIns="90000" rIns="90000"/>
-                    <a:p>
-                      <a:r>
-                        <a:rPr b="0" lang="en-IN" sz="1500" spc="-1" strike="noStrike">
-                          <a:solidFill>
-                            <a:srgbClr val="000000"/>
-                          </a:solidFill>
-                          <a:uFill>
-                            <a:solidFill>
-                              <a:srgbClr val="ffffff"/>
-                            </a:solidFill>
-                          </a:uFill>
-                          <a:latin typeface="Arial"/>
-                        </a:rPr>
-                        <a:t>Request Param</a:t>
-                      </a:r>
-                      <a:endParaRPr b="0" lang="en-IN" sz="1800" spc="-1" strike="noStrike">
-                        <a:solidFill>
-                          <a:srgbClr val="000000"/>
-                        </a:solidFill>
-                        <a:uFill>
-                          <a:solidFill>
-                            <a:srgbClr val="ffffff"/>
-                          </a:solidFill>
-                        </a:uFill>
-                        <a:latin typeface="Arial"/>
-                      </a:endParaRPr>
-                    </a:p>
-                  </a:txBody>
-                  <a:tcPr marL="90000" marR="90000">
-                    <a:lnL w="720">
-                      <a:solidFill>
-                        <a:srgbClr val="ffffff"/>
-                      </a:solidFill>
-                    </a:lnL>
-                    <a:lnR w="720">
-                      <a:solidFill>
-                        <a:srgbClr val="ffffff"/>
-                      </a:solidFill>
-                    </a:lnR>
-                    <a:lnT w="720">
-                      <a:solidFill>
-                        <a:srgbClr val="ffffff"/>
-                      </a:solidFill>
-                    </a:lnT>
-                    <a:lnB w="720">
-                      <a:solidFill>
-                        <a:srgbClr val="ffffff"/>
-                      </a:solidFill>
-                    </a:lnB>
-                    <a:solidFill>
-                      <a:srgbClr val="e6e6ff"/>
-                    </a:solidFill>
-                  </a:tcPr>
-                </a:tc>
-                <a:tc>
-                  <a:txBody>
-                    <a:bodyPr lIns="90000" rIns="90000"/>
-                    <a:p>
-                      <a:r>
-                        <a:rPr b="0" lang="en-IN" sz="1500" spc="-1" strike="noStrike">
-                          <a:solidFill>
-                            <a:srgbClr val="000000"/>
-                          </a:solidFill>
-                          <a:uFill>
-                            <a:solidFill>
-                              <a:srgbClr val="ffffff"/>
-                            </a:solidFill>
-                          </a:uFill>
-                          <a:latin typeface="Arial"/>
-                        </a:rPr>
-                        <a:t>random value matching pattern [0-9a-f]{32}</a:t>
-                      </a:r>
-                      <a:endParaRPr b="0" lang="en-IN" sz="1800" spc="-1" strike="noStrike">
-                        <a:solidFill>
-                          <a:srgbClr val="000000"/>
-                        </a:solidFill>
-                        <a:uFill>
-                          <a:solidFill>
-                            <a:srgbClr val="ffffff"/>
-                          </a:solidFill>
-                        </a:uFill>
-                        <a:latin typeface="Arial"/>
-                      </a:endParaRPr>
-                    </a:p>
-                  </a:txBody>
-                  <a:tcPr marL="90000" marR="90000">
-                    <a:lnL w="720">
-                      <a:solidFill>
-                        <a:srgbClr val="ffffff"/>
-                      </a:solidFill>
-                    </a:lnL>
-                    <a:lnR w="720">
-                      <a:solidFill>
-                        <a:srgbClr val="ffffff"/>
-                      </a:solidFill>
-                    </a:lnR>
-                    <a:lnT w="720">
-                      <a:solidFill>
-                        <a:srgbClr val="ffffff"/>
-                      </a:solidFill>
-                    </a:lnT>
-                    <a:lnB w="720">
-                      <a:solidFill>
-                        <a:srgbClr val="ffffff"/>
-                      </a:solidFill>
-                    </a:lnB>
-                    <a:solidFill>
-                      <a:srgbClr val="e6e6ff"/>
-                    </a:solidFill>
-                  </a:tcPr>
-                </a:tc>
-              </a:tr>
               <a:tr h="517320">
                 <a:tc>
                   <a:txBody>
@@ -7694,7 +7427,7 @@
                   </a:tcPr>
                 </a:tc>
               </a:tr>
-              <a:tr h="304920">
+              <a:tr h="304560">
                 <a:tc>
                   <a:txBody>
                     <a:bodyPr lIns="90000" rIns="90000"/>
@@ -7929,7 +7662,7 @@
         <p:spPr>
           <a:xfrm>
             <a:off x="288000" y="75600"/>
-            <a:ext cx="8518320" cy="570600"/>
+            <a:ext cx="8517960" cy="570240"/>
           </a:xfrm>
           <a:prstGeom prst="rect">
             <a:avLst/>
@@ -7966,7 +7699,7 @@
                 <a:latin typeface="Arial"/>
                 <a:ea typeface="Arial"/>
               </a:rPr>
-              <a:t>APM New API Security Considerations</a:t>
+              <a:t>APM New API Details - continued</a:t>
             </a:r>
             <a:endParaRPr b="0" lang="en-IN" sz="1800" spc="-1" strike="noStrike">
               <a:solidFill>
@@ -7982,44 +7715,615 @@
           </a:p>
         </p:txBody>
       </p:sp>
+      <p:sp>
+        <p:nvSpPr>
+          <p:cNvPr id="105" name="CustomShape 2"/>
+          <p:cNvSpPr/>
+          <p:nvPr/>
+        </p:nvSpPr>
+        <p:spPr>
+          <a:xfrm>
+            <a:off x="432000" y="661680"/>
+            <a:ext cx="7918920" cy="1113120"/>
+          </a:xfrm>
+          <a:prstGeom prst="rect">
+            <a:avLst/>
+          </a:prstGeom>
+          <a:noFill/>
+          <a:ln>
+            <a:noFill/>
+          </a:ln>
+        </p:spPr>
+        <p:style>
+          <a:lnRef idx="0"/>
+          <a:fillRef idx="0"/>
+          <a:effectRef idx="0"/>
+          <a:fontRef idx="minor"/>
+        </p:style>
+        <p:txBody>
+          <a:bodyPr lIns="90000" rIns="90000" tIns="45000" bIns="45000"/>
+          <a:p>
+            <a:endParaRPr b="0" lang="en-IN" sz="1800" spc="-1" strike="noStrike">
+              <a:solidFill>
+                <a:srgbClr val="000000"/>
+              </a:solidFill>
+              <a:uFill>
+                <a:solidFill>
+                  <a:srgbClr val="ffffff"/>
+                </a:solidFill>
+              </a:uFill>
+              <a:latin typeface="Arial"/>
+            </a:endParaRPr>
+          </a:p>
+          <a:p>
+            <a:r>
+              <a:rPr b="1" lang="en-IN" sz="1800" spc="-1" strike="noStrike">
+                <a:solidFill>
+                  <a:srgbClr val="000000"/>
+                </a:solidFill>
+                <a:uFill>
+                  <a:solidFill>
+                    <a:srgbClr val="ffffff"/>
+                  </a:solidFill>
+                </a:uFill>
+                <a:latin typeface="Arial"/>
+                <a:ea typeface="DejaVu Sans"/>
+              </a:rPr>
+              <a:t>Ouput Parameters:</a:t>
+            </a:r>
+            <a:endParaRPr b="0" lang="en-IN" sz="1800" spc="-1" strike="noStrike">
+              <a:solidFill>
+                <a:srgbClr val="000000"/>
+              </a:solidFill>
+              <a:uFill>
+                <a:solidFill>
+                  <a:srgbClr val="ffffff"/>
+                </a:solidFill>
+              </a:uFill>
+              <a:latin typeface="Arial"/>
+            </a:endParaRPr>
+          </a:p>
+        </p:txBody>
+      </p:sp>
       <p:graphicFrame>
         <p:nvGraphicFramePr>
-          <p:cNvPr id="105" name="Object 2"/>
+          <p:cNvPr id="106" name="Table 3"/>
           <p:cNvGraphicFramePr/>
           <p:nvPr/>
         </p:nvGraphicFramePr>
         <p:xfrm>
-          <a:off x="3547800" y="2168280"/>
-          <a:ext cx="2047680" cy="806400"/>
+          <a:off x="504000" y="1584000"/>
+          <a:ext cx="8351640" cy="3384720"/>
         </p:xfrm>
         <a:graphic>
-          <a:graphicData uri="http://schemas.openxmlformats.org/presentationml/2006/ole">
-            <p:oleObj progId="Excel.Sheet.12" r:id="rId1" spid="">
-              <p:embed/>
-              <p:pic>
-                <p:nvPicPr>
-                  <p:cNvPr id="106" name="" descr=""/>
-                  <p:cNvPicPr/>
-                  <p:nvPr/>
-                </p:nvPicPr>
-                <p:blipFill>
-                  <a:blip r:embed="rId2"/>
-                  <a:stretch/>
-                </p:blipFill>
-                <p:spPr>
-                  <a:xfrm>
-                    <a:off x="3547800" y="2168280"/>
-                    <a:ext cx="2047680" cy="806400"/>
-                  </a:xfrm>
-                  <a:prstGeom prst="rect">
-                    <a:avLst/>
-                  </a:prstGeom>
-                  <a:ln>
-                    <a:noFill/>
-                  </a:ln>
-                </p:spPr>
-              </p:pic>
-            </p:oleObj>
+          <a:graphicData uri="http://schemas.openxmlformats.org/drawingml/2006/table">
+            <a:tbl>
+              <a:tblPr/>
+              <a:tblGrid>
+                <a:gridCol w="1638360"/>
+                <a:gridCol w="1796040"/>
+                <a:gridCol w="4917600"/>
+              </a:tblGrid>
+              <a:tr h="305640">
+                <a:tc>
+                  <a:txBody>
+                    <a:bodyPr lIns="90000" rIns="90000"/>
+                    <a:p>
+                      <a:r>
+                        <a:rPr b="0" lang="en-IN" sz="1500" spc="-1" strike="noStrike">
+                          <a:solidFill>
+                            <a:srgbClr val="000000"/>
+                          </a:solidFill>
+                          <a:uFill>
+                            <a:solidFill>
+                              <a:srgbClr val="ffffff"/>
+                            </a:solidFill>
+                          </a:uFill>
+                          <a:latin typeface="Arial"/>
+                        </a:rPr>
+                        <a:t>Field</a:t>
+                      </a:r>
+                      <a:endParaRPr b="0" lang="en-IN" sz="1800" spc="-1" strike="noStrike">
+                        <a:solidFill>
+                          <a:srgbClr val="000000"/>
+                        </a:solidFill>
+                        <a:uFill>
+                          <a:solidFill>
+                            <a:srgbClr val="ffffff"/>
+                          </a:solidFill>
+                        </a:uFill>
+                        <a:latin typeface="Arial"/>
+                      </a:endParaRPr>
+                    </a:p>
+                  </a:txBody>
+                  <a:tcPr marL="90000" marR="90000">
+                    <a:lnL w="720">
+                      <a:solidFill>
+                        <a:srgbClr val="ffffff"/>
+                      </a:solidFill>
+                    </a:lnL>
+                    <a:lnR w="720">
+                      <a:solidFill>
+                        <a:srgbClr val="ffffff"/>
+                      </a:solidFill>
+                    </a:lnR>
+                    <a:lnT w="720">
+                      <a:solidFill>
+                        <a:srgbClr val="ffffff"/>
+                      </a:solidFill>
+                    </a:lnT>
+                    <a:lnB w="720">
+                      <a:solidFill>
+                        <a:srgbClr val="ffffff"/>
+                      </a:solidFill>
+                    </a:lnB>
+                    <a:solidFill>
+                      <a:srgbClr val="9999cc"/>
+                    </a:solidFill>
+                  </a:tcPr>
+                </a:tc>
+                <a:tc>
+                  <a:txBody>
+                    <a:bodyPr lIns="90000" rIns="90000"/>
+                    <a:p>
+                      <a:r>
+                        <a:rPr b="0" lang="en-IN" sz="1500" spc="-1" strike="noStrike">
+                          <a:solidFill>
+                            <a:srgbClr val="000000"/>
+                          </a:solidFill>
+                          <a:uFill>
+                            <a:solidFill>
+                              <a:srgbClr val="ffffff"/>
+                            </a:solidFill>
+                          </a:uFill>
+                          <a:latin typeface="Arial"/>
+                        </a:rPr>
+                        <a:t>Type</a:t>
+                      </a:r>
+                      <a:endParaRPr b="0" lang="en-IN" sz="1800" spc="-1" strike="noStrike">
+                        <a:solidFill>
+                          <a:srgbClr val="000000"/>
+                        </a:solidFill>
+                        <a:uFill>
+                          <a:solidFill>
+                            <a:srgbClr val="ffffff"/>
+                          </a:solidFill>
+                        </a:uFill>
+                        <a:latin typeface="Arial"/>
+                      </a:endParaRPr>
+                    </a:p>
+                  </a:txBody>
+                  <a:tcPr marL="90000" marR="90000">
+                    <a:lnL w="720">
+                      <a:solidFill>
+                        <a:srgbClr val="ffffff"/>
+                      </a:solidFill>
+                    </a:lnL>
+                    <a:lnR w="720">
+                      <a:solidFill>
+                        <a:srgbClr val="ffffff"/>
+                      </a:solidFill>
+                    </a:lnR>
+                    <a:lnT w="720">
+                      <a:solidFill>
+                        <a:srgbClr val="ffffff"/>
+                      </a:solidFill>
+                    </a:lnT>
+                    <a:lnB w="720">
+                      <a:solidFill>
+                        <a:srgbClr val="ffffff"/>
+                      </a:solidFill>
+                    </a:lnB>
+                    <a:solidFill>
+                      <a:srgbClr val="9999cc"/>
+                    </a:solidFill>
+                  </a:tcPr>
+                </a:tc>
+                <a:tc>
+                  <a:txBody>
+                    <a:bodyPr lIns="90000" rIns="90000"/>
+                    <a:p>
+                      <a:r>
+                        <a:rPr b="0" lang="en-IN" sz="1500" spc="-1" strike="noStrike">
+                          <a:solidFill>
+                            <a:srgbClr val="000000"/>
+                          </a:solidFill>
+                          <a:uFill>
+                            <a:solidFill>
+                              <a:srgbClr val="ffffff"/>
+                            </a:solidFill>
+                          </a:uFill>
+                          <a:latin typeface="Arial"/>
+                        </a:rPr>
+                        <a:t>How to get this value</a:t>
+                      </a:r>
+                      <a:endParaRPr b="0" lang="en-IN" sz="1800" spc="-1" strike="noStrike">
+                        <a:solidFill>
+                          <a:srgbClr val="000000"/>
+                        </a:solidFill>
+                        <a:uFill>
+                          <a:solidFill>
+                            <a:srgbClr val="ffffff"/>
+                          </a:solidFill>
+                        </a:uFill>
+                        <a:latin typeface="Arial"/>
+                      </a:endParaRPr>
+                    </a:p>
+                  </a:txBody>
+                  <a:tcPr marL="90000" marR="90000">
+                    <a:lnL w="720">
+                      <a:solidFill>
+                        <a:srgbClr val="ffffff"/>
+                      </a:solidFill>
+                    </a:lnL>
+                    <a:lnR w="720">
+                      <a:solidFill>
+                        <a:srgbClr val="ffffff"/>
+                      </a:solidFill>
+                    </a:lnR>
+                    <a:lnT w="720">
+                      <a:solidFill>
+                        <a:srgbClr val="ffffff"/>
+                      </a:solidFill>
+                    </a:lnT>
+                    <a:lnB w="720">
+                      <a:solidFill>
+                        <a:srgbClr val="ffffff"/>
+                      </a:solidFill>
+                    </a:lnB>
+                    <a:solidFill>
+                      <a:srgbClr val="9999cc"/>
+                    </a:solidFill>
+                  </a:tcPr>
+                </a:tc>
+              </a:tr>
+              <a:tr h="305640">
+                <a:tc>
+                  <a:txBody>
+                    <a:bodyPr lIns="90000" rIns="90000"/>
+                    <a:p>
+                      <a:r>
+                        <a:rPr b="0" lang="en-IN" sz="1500" spc="-1" strike="noStrike">
+                          <a:solidFill>
+                            <a:srgbClr val="000000"/>
+                          </a:solidFill>
+                          <a:uFill>
+                            <a:solidFill>
+                              <a:srgbClr val="ffffff"/>
+                            </a:solidFill>
+                          </a:uFill>
+                          <a:latin typeface="Arial"/>
+                        </a:rPr>
+                        <a:t>appId</a:t>
+                      </a:r>
+                      <a:endParaRPr b="0" lang="en-IN" sz="1800" spc="-1" strike="noStrike">
+                        <a:solidFill>
+                          <a:srgbClr val="000000"/>
+                        </a:solidFill>
+                        <a:uFill>
+                          <a:solidFill>
+                            <a:srgbClr val="ffffff"/>
+                          </a:solidFill>
+                        </a:uFill>
+                        <a:latin typeface="Arial"/>
+                      </a:endParaRPr>
+                    </a:p>
+                  </a:txBody>
+                  <a:tcPr marL="90000" marR="90000">
+                    <a:lnL w="720">
+                      <a:solidFill>
+                        <a:srgbClr val="ffffff"/>
+                      </a:solidFill>
+                    </a:lnL>
+                    <a:lnR w="720">
+                      <a:solidFill>
+                        <a:srgbClr val="ffffff"/>
+                      </a:solidFill>
+                    </a:lnR>
+                    <a:lnT w="720">
+                      <a:solidFill>
+                        <a:srgbClr val="ffffff"/>
+                      </a:solidFill>
+                    </a:lnT>
+                    <a:lnB w="720">
+                      <a:solidFill>
+                        <a:srgbClr val="ffffff"/>
+                      </a:solidFill>
+                    </a:lnB>
+                    <a:solidFill>
+                      <a:srgbClr val="ffffff"/>
+                    </a:solidFill>
+                  </a:tcPr>
+                </a:tc>
+                <a:tc>
+                  <a:txBody>
+                    <a:bodyPr lIns="90000" rIns="90000"/>
+                    <a:p>
+                      <a:r>
+                        <a:rPr b="0" lang="en-IN" sz="1500" spc="-1" strike="noStrike">
+                          <a:solidFill>
+                            <a:srgbClr val="000000"/>
+                          </a:solidFill>
+                          <a:uFill>
+                            <a:solidFill>
+                              <a:srgbClr val="ffffff"/>
+                            </a:solidFill>
+                          </a:uFill>
+                          <a:latin typeface="Arial"/>
+                        </a:rPr>
+                        <a:t>String</a:t>
+                      </a:r>
+                      <a:endParaRPr b="0" lang="en-IN" sz="1800" spc="-1" strike="noStrike">
+                        <a:solidFill>
+                          <a:srgbClr val="000000"/>
+                        </a:solidFill>
+                        <a:uFill>
+                          <a:solidFill>
+                            <a:srgbClr val="ffffff"/>
+                          </a:solidFill>
+                        </a:uFill>
+                        <a:latin typeface="Arial"/>
+                      </a:endParaRPr>
+                    </a:p>
+                  </a:txBody>
+                  <a:tcPr marL="90000" marR="90000">
+                    <a:lnL w="720">
+                      <a:solidFill>
+                        <a:srgbClr val="ffffff"/>
+                      </a:solidFill>
+                    </a:lnL>
+                    <a:lnR w="720">
+                      <a:solidFill>
+                        <a:srgbClr val="ffffff"/>
+                      </a:solidFill>
+                    </a:lnR>
+                    <a:lnT w="720">
+                      <a:solidFill>
+                        <a:srgbClr val="ffffff"/>
+                      </a:solidFill>
+                    </a:lnT>
+                    <a:lnB w="720">
+                      <a:solidFill>
+                        <a:srgbClr val="ffffff"/>
+                      </a:solidFill>
+                    </a:lnB>
+                    <a:solidFill>
+                      <a:srgbClr val="ffffff"/>
+                    </a:solidFill>
+                  </a:tcPr>
+                </a:tc>
+                <a:tc>
+                  <a:txBody>
+                    <a:bodyPr lIns="90000" rIns="90000"/>
+                    <a:p>
+                      <a:r>
+                        <a:rPr b="0" lang="en-IN" sz="1500" spc="-1" strike="noStrike">
+                          <a:solidFill>
+                            <a:srgbClr val="000000"/>
+                          </a:solidFill>
+                          <a:uFill>
+                            <a:solidFill>
+                              <a:srgbClr val="ffffff"/>
+                            </a:solidFill>
+                          </a:uFill>
+                          <a:latin typeface="Arial"/>
+                        </a:rPr>
+                        <a:t>random value matching pattern [0-9a-f]{32}</a:t>
+                      </a:r>
+                      <a:endParaRPr b="0" lang="en-IN" sz="1800" spc="-1" strike="noStrike">
+                        <a:solidFill>
+                          <a:srgbClr val="000000"/>
+                        </a:solidFill>
+                        <a:uFill>
+                          <a:solidFill>
+                            <a:srgbClr val="ffffff"/>
+                          </a:solidFill>
+                        </a:uFill>
+                        <a:latin typeface="Arial"/>
+                      </a:endParaRPr>
+                    </a:p>
+                  </a:txBody>
+                  <a:tcPr marL="90000" marR="90000">
+                    <a:lnL w="720">
+                      <a:solidFill>
+                        <a:srgbClr val="ffffff"/>
+                      </a:solidFill>
+                    </a:lnL>
+                    <a:lnR w="720">
+                      <a:solidFill>
+                        <a:srgbClr val="ffffff"/>
+                      </a:solidFill>
+                    </a:lnR>
+                    <a:lnT w="720">
+                      <a:solidFill>
+                        <a:srgbClr val="ffffff"/>
+                      </a:solidFill>
+                    </a:lnT>
+                    <a:lnB w="720">
+                      <a:solidFill>
+                        <a:srgbClr val="ffffff"/>
+                      </a:solidFill>
+                    </a:lnB>
+                    <a:solidFill>
+                      <a:srgbClr val="ffffff"/>
+                    </a:solidFill>
+                  </a:tcPr>
+                </a:tc>
+              </a:tr>
+              <a:tr h="305640">
+                <a:tc>
+                  <a:txBody>
+                    <a:bodyPr lIns="90000" rIns="90000"/>
+                    <a:p>
+                      <a:r>
+                        <a:rPr b="0" lang="en-IN" sz="1500" spc="-1" strike="noStrike">
+                          <a:solidFill>
+                            <a:srgbClr val="000000"/>
+                          </a:solidFill>
+                          <a:uFill>
+                            <a:solidFill>
+                              <a:srgbClr val="ffffff"/>
+                            </a:solidFill>
+                          </a:uFill>
+                          <a:latin typeface="Arial"/>
+                        </a:rPr>
+                        <a:t>appPackageId</a:t>
+                      </a:r>
+                      <a:endParaRPr b="0" lang="en-IN" sz="1800" spc="-1" strike="noStrike">
+                        <a:solidFill>
+                          <a:srgbClr val="000000"/>
+                        </a:solidFill>
+                        <a:uFill>
+                          <a:solidFill>
+                            <a:srgbClr val="ffffff"/>
+                          </a:solidFill>
+                        </a:uFill>
+                        <a:latin typeface="Arial"/>
+                      </a:endParaRPr>
+                    </a:p>
+                  </a:txBody>
+                  <a:tcPr marL="90000" marR="90000">
+                    <a:lnL w="720">
+                      <a:solidFill>
+                        <a:srgbClr val="ffffff"/>
+                      </a:solidFill>
+                    </a:lnL>
+                    <a:lnR w="720">
+                      <a:solidFill>
+                        <a:srgbClr val="ffffff"/>
+                      </a:solidFill>
+                    </a:lnR>
+                    <a:lnT w="720">
+                      <a:solidFill>
+                        <a:srgbClr val="ffffff"/>
+                      </a:solidFill>
+                    </a:lnT>
+                    <a:lnB w="720">
+                      <a:solidFill>
+                        <a:srgbClr val="ffffff"/>
+                      </a:solidFill>
+                    </a:lnB>
+                    <a:solidFill>
+                      <a:srgbClr val="e6e6ff"/>
+                    </a:solidFill>
+                  </a:tcPr>
+                </a:tc>
+                <a:tc>
+                  <a:txBody>
+                    <a:bodyPr lIns="90000" rIns="90000"/>
+                    <a:p>
+                      <a:r>
+                        <a:rPr b="0" lang="en-IN" sz="1500" spc="-1" strike="noStrike">
+                          <a:solidFill>
+                            <a:srgbClr val="000000"/>
+                          </a:solidFill>
+                          <a:uFill>
+                            <a:solidFill>
+                              <a:srgbClr val="ffffff"/>
+                            </a:solidFill>
+                          </a:uFill>
+                          <a:latin typeface="Arial"/>
+                        </a:rPr>
+                        <a:t>String</a:t>
+                      </a:r>
+                      <a:endParaRPr b="0" lang="en-IN" sz="1800" spc="-1" strike="noStrike">
+                        <a:solidFill>
+                          <a:srgbClr val="000000"/>
+                        </a:solidFill>
+                        <a:uFill>
+                          <a:solidFill>
+                            <a:srgbClr val="ffffff"/>
+                          </a:solidFill>
+                        </a:uFill>
+                        <a:latin typeface="Arial"/>
+                      </a:endParaRPr>
+                    </a:p>
+                  </a:txBody>
+                  <a:tcPr marL="90000" marR="90000">
+                    <a:lnL w="720">
+                      <a:solidFill>
+                        <a:srgbClr val="ffffff"/>
+                      </a:solidFill>
+                    </a:lnL>
+                    <a:lnR w="720">
+                      <a:solidFill>
+                        <a:srgbClr val="ffffff"/>
+                      </a:solidFill>
+                    </a:lnR>
+                    <a:lnT w="720">
+                      <a:solidFill>
+                        <a:srgbClr val="ffffff"/>
+                      </a:solidFill>
+                    </a:lnT>
+                    <a:lnB w="720">
+                      <a:solidFill>
+                        <a:srgbClr val="ffffff"/>
+                      </a:solidFill>
+                    </a:lnB>
+                    <a:solidFill>
+                      <a:srgbClr val="e6e6ff"/>
+                    </a:solidFill>
+                  </a:tcPr>
+                </a:tc>
+                <a:tc>
+                  <a:txBody>
+                    <a:bodyPr lIns="90000" rIns="90000"/>
+                    <a:p>
+                      <a:r>
+                        <a:rPr b="0" lang="en-IN" sz="1500" spc="-1" strike="noStrike">
+                          <a:solidFill>
+                            <a:srgbClr val="000000"/>
+                          </a:solidFill>
+                          <a:uFill>
+                            <a:solidFill>
+                              <a:srgbClr val="ffffff"/>
+                            </a:solidFill>
+                          </a:uFill>
+                          <a:latin typeface="Arial"/>
+                        </a:rPr>
+                        <a:t>random value matching pattern [0-9a-f]{32}</a:t>
+                      </a:r>
+                      <a:endParaRPr b="0" lang="en-IN" sz="1800" spc="-1" strike="noStrike">
+                        <a:solidFill>
+                          <a:srgbClr val="000000"/>
+                        </a:solidFill>
+                        <a:uFill>
+                          <a:solidFill>
+                            <a:srgbClr val="ffffff"/>
+                          </a:solidFill>
+                        </a:uFill>
+                        <a:latin typeface="Arial"/>
+                      </a:endParaRPr>
+                    </a:p>
+                  </a:txBody>
+                  <a:tcPr marL="90000" marR="90000">
+                    <a:lnL w="720">
+                      <a:solidFill>
+                        <a:srgbClr val="ffffff"/>
+                      </a:solidFill>
+                    </a:lnL>
+                    <a:lnR w="720">
+                      <a:solidFill>
+                        <a:srgbClr val="ffffff"/>
+                      </a:solidFill>
+                    </a:lnR>
+                    <a:lnT w="720">
+                      <a:solidFill>
+                        <a:srgbClr val="ffffff"/>
+                      </a:solidFill>
+                    </a:lnT>
+                    <a:lnB w="720">
+                      <a:solidFill>
+                        <a:srgbClr val="ffffff"/>
+                      </a:solidFill>
+                    </a:lnB>
+                    <a:solidFill>
+                      <a:srgbClr val="e6e6ff"/>
+                    </a:solidFill>
+                  </a:tcPr>
+                </a:tc>
+              </a:tr>
+            </a:tbl>
           </a:graphicData>
         </a:graphic>
       </p:graphicFrame>
@@ -8080,8 +8384,160 @@
         </p:nvSpPr>
         <p:spPr>
           <a:xfrm>
+            <a:off x="288000" y="75600"/>
+            <a:ext cx="8517960" cy="570240"/>
+          </a:xfrm>
+          <a:prstGeom prst="rect">
+            <a:avLst/>
+          </a:prstGeom>
+          <a:noFill/>
+          <a:ln>
+            <a:noFill/>
+          </a:ln>
+        </p:spPr>
+        <p:style>
+          <a:lnRef idx="0"/>
+          <a:fillRef idx="0"/>
+          <a:effectRef idx="0"/>
+          <a:fontRef idx="minor"/>
+        </p:style>
+        <p:txBody>
+          <a:bodyPr lIns="90000" rIns="90000" tIns="91440" bIns="91440"/>
+          <a:p>
+            <a:pPr>
+              <a:lnSpc>
+                <a:spcPct val="100000"/>
+              </a:lnSpc>
+            </a:pPr>
+            <a:r>
+              <a:rPr b="0" lang="en-IN" sz="2800" spc="-1" strike="noStrike">
+                <a:solidFill>
+                  <a:srgbClr val="000000"/>
+                </a:solidFill>
+                <a:uFill>
+                  <a:solidFill>
+                    <a:srgbClr val="ffffff"/>
+                  </a:solidFill>
+                </a:uFill>
+                <a:latin typeface="Arial"/>
+                <a:ea typeface="Arial"/>
+              </a:rPr>
+              <a:t>APM New API Security Considerations</a:t>
+            </a:r>
+            <a:endParaRPr b="0" lang="en-IN" sz="1800" spc="-1" strike="noStrike">
+              <a:solidFill>
+                <a:srgbClr val="000000"/>
+              </a:solidFill>
+              <a:uFill>
+                <a:solidFill>
+                  <a:srgbClr val="ffffff"/>
+                </a:solidFill>
+              </a:uFill>
+              <a:latin typeface="Arial"/>
+            </a:endParaRPr>
+          </a:p>
+        </p:txBody>
+      </p:sp>
+      <p:graphicFrame>
+        <p:nvGraphicFramePr>
+          <p:cNvPr id="108" name="Object 2"/>
+          <p:cNvGraphicFramePr/>
+          <p:nvPr/>
+        </p:nvGraphicFramePr>
+        <p:xfrm>
+          <a:off x="3547800" y="2168280"/>
+          <a:ext cx="2047320" cy="806040"/>
+        </p:xfrm>
+        <a:graphic>
+          <a:graphicData uri="http://schemas.openxmlformats.org/presentationml/2006/ole">
+            <p:oleObj progId="Excel.Sheet.12" r:id="rId1" spid="">
+              <p:embed/>
+              <p:pic>
+                <p:nvPicPr>
+                  <p:cNvPr id="109" name="" descr=""/>
+                  <p:cNvPicPr/>
+                  <p:nvPr/>
+                </p:nvPicPr>
+                <p:blipFill>
+                  <a:blip r:embed="rId2"/>
+                  <a:stretch/>
+                </p:blipFill>
+                <p:spPr>
+                  <a:xfrm>
+                    <a:off x="3547800" y="2168280"/>
+                    <a:ext cx="2047320" cy="806040"/>
+                  </a:xfrm>
+                  <a:prstGeom prst="rect">
+                    <a:avLst/>
+                  </a:prstGeom>
+                  <a:ln>
+                    <a:noFill/>
+                  </a:ln>
+                </p:spPr>
+              </p:pic>
+            </p:oleObj>
+          </a:graphicData>
+        </a:graphic>
+      </p:graphicFrame>
+    </p:spTree>
+  </p:cSld>
+  <p:timing>
+    <p:tnLst>
+      <p:par>
+        <p:cTn id="11" dur="indefinite" restart="never" nodeType="tmRoot">
+          <p:childTnLst>
+            <p:seq>
+              <p:cTn id="12" dur="indefinite" nodeType="mainSeq"/>
+              <p:prevCondLst>
+                <p:cond delay="0" evt="onPrev">
+                  <p:tgtEl>
+                    <p:sldTgt/>
+                  </p:tgtEl>
+                </p:cond>
+              </p:prevCondLst>
+              <p:nextCondLst>
+                <p:cond delay="0" evt="onNext">
+                  <p:tgtEl>
+                    <p:sldTgt/>
+                  </p:tgtEl>
+                </p:cond>
+              </p:nextCondLst>
+            </p:seq>
+          </p:childTnLst>
+        </p:cTn>
+      </p:par>
+    </p:tnLst>
+  </p:timing>
+</p:sld>
+</file>
+
+<file path=ppt/slides/slide7.xml><?xml version="1.0" encoding="utf-8"?>
+<p:sld xmlns:a="http://schemas.openxmlformats.org/drawingml/2006/main" xmlns:p="http://schemas.openxmlformats.org/presentationml/2006/main" xmlns:r="http://schemas.openxmlformats.org/officeDocument/2006/relationships" xmlns:p14="http://schemas.microsoft.com/office/powerpoint/2010/main" xmlns:p15="http://schemas.microsoft.com/office/powerpoint/2012/main" xmlns:mc="http://schemas.openxmlformats.org/markup-compatibility/2006">
+  <p:cSld>
+    <p:spTree>
+      <p:nvGrpSpPr>
+        <p:cNvPr id="1" name=""/>
+        <p:cNvGrpSpPr/>
+        <p:nvPr/>
+      </p:nvGrpSpPr>
+      <p:grpSpPr>
+        <a:xfrm>
+          <a:off x="0" y="0"/>
+          <a:ext cx="0" cy="0"/>
+          <a:chOff x="0" y="0"/>
+          <a:chExt cx="0" cy="0"/>
+        </a:xfrm>
+      </p:grpSpPr>
+      <p:sp>
+        <p:nvSpPr>
+          <p:cNvPr id="110" name="CustomShape 1"/>
+          <p:cNvSpPr/>
+          <p:nvPr/>
+        </p:nvSpPr>
+        <p:spPr>
+          <a:xfrm>
             <a:off x="242280" y="2571840"/>
-            <a:ext cx="8518320" cy="570600"/>
+            <a:ext cx="8517960" cy="570240"/>
           </a:xfrm>
           <a:prstGeom prst="rect">
             <a:avLst/>
@@ -8139,10 +8595,10 @@
   <p:timing>
     <p:tnLst>
       <p:par>
-        <p:cTn id="11" dur="indefinite" restart="never" nodeType="tmRoot">
+        <p:cTn id="13" dur="indefinite" restart="never" nodeType="tmRoot">
           <p:childTnLst>
             <p:seq>
-              <p:cTn id="12" dur="indefinite" nodeType="mainSeq"/>
+              <p:cTn id="14" dur="indefinite" nodeType="mainSeq"/>
               <p:prevCondLst>
                 <p:cond delay="0" evt="onPrev">
                   <p:tgtEl>

</xml_diff>